<commit_message>
added workflow ppt revision
</commit_message>
<xml_diff>
--- a/Workflow.pptx
+++ b/Workflow.pptx
@@ -3592,13 +3592,14 @@
           <p:cNvCxnSpPr>
             <a:cxnSpLocks/>
             <a:stCxn id="3" idx="2"/>
+            <a:endCxn id="16" idx="1"/>
           </p:cNvCxnSpPr>
           <p:nvPr/>
         </p:nvCxnSpPr>
         <p:spPr>
           <a:xfrm>
             <a:off x="4176926" y="1368869"/>
-            <a:ext cx="311361" cy="1008184"/>
+            <a:ext cx="258985" cy="690148"/>
           </a:xfrm>
           <a:prstGeom prst="straightConnector1">
             <a:avLst/>
@@ -4031,7 +4032,7 @@
           <p:nvPr>
             <p:extLst>
               <p:ext uri="{D42A27DB-BD31-4B8C-83A1-F6EECF244321}">
-                <p14:modId xmlns:p14="http://schemas.microsoft.com/office/powerpoint/2010/main" val="1438570315"/>
+                <p14:modId xmlns:p14="http://schemas.microsoft.com/office/powerpoint/2010/main" val="4028434175"/>
               </p:ext>
             </p:extLst>
           </p:nvPr>

</xml_diff>